<commit_message>
ppt and README.MD update
</commit_message>
<xml_diff>
--- a/project-presentation-template-original.pptx
+++ b/project-presentation-template-original.pptx
@@ -6202,8 +6202,8 @@
         </p:nvSpPr>
         <p:spPr>
           <a:xfrm>
-            <a:off x="311708" y="744575"/>
-            <a:ext cx="8520600" cy="2052600"/>
+            <a:off x="311708" y="954157"/>
+            <a:ext cx="8520600" cy="2926080"/>
           </a:xfrm>
           <a:prstGeom prst="rect">
             <a:avLst/>
@@ -6215,23 +6215,16 @@
           </a:bodyPr>
           <a:lstStyle/>
           <a:p>
-            <a:pPr marL="0" lvl="0" indent="0" algn="ctr" rtl="0">
-              <a:spcBef>
-                <a:spcPts val="0"/>
-              </a:spcBef>
-              <a:spcAft>
-                <a:spcPts val="0"/>
-              </a:spcAft>
-              <a:buNone/>
-            </a:pPr>
             <a:r>
+              <a:rPr lang="en-US" sz="3200" b="1" dirty="0"/>
+              <a:t>Covid Stats/Kayak Planner</a:t>
+            </a:r>
+            <a:br>
+              <a:rPr lang="en-US" sz="3200" b="1" dirty="0"/>
+            </a:br>
+            <a:br>
               <a:rPr lang="en-US" dirty="0"/>
-              <a:t>S</a:t>
-            </a:r>
-            <a:r>
-              <a:rPr lang="en" dirty="0"/>
-              <a:t>mart Trip</a:t>
-            </a:r>
+            </a:br>
             <a:endParaRPr dirty="0"/>
           </a:p>
         </p:txBody>
@@ -6342,7 +6335,7 @@
             </a:pPr>
             <a:r>
               <a:rPr lang="en-US" dirty="0"/>
-              <a:t>Modern problems require modern solutions. As a big traveling enthusiasts and health advocates, we are excited that now trips can be safer, and so, more enjoyable. Our webpage will provide you with up to-date information about current Covid-19 data in each metropolitan area of the country, so you can be fully informed. Should you decide to go, the web-page will provide you with local attractions so you can fully enjoy your trip. </a:t>
+              <a:t>Modern problems require modern solutions. As a big traveling enthusiasts and health advocates, we are excited that now trips can be safer, and so, more enjoyable. Our webpage will provide you with up to-date information about current Covid-19 data in each metropolitan area of the country, so you can be fully informed. Should you decide to go, the web-page will allow you to use Kayak to search for flights and hotels.</a:t>
             </a:r>
           </a:p>
         </p:txBody>
@@ -6451,7 +6444,15 @@
             </a:pPr>
             <a:r>
               <a:rPr lang="en" sz="1600" dirty="0"/>
-              <a:t>Description: Web page provide user with information with Covid-19 data in selected metropolitan area, as well as with local attractions for this area. </a:t>
+              <a:t>Description: Web page provide user with information about Covid-19 data in selected </a:t>
+            </a:r>
+            <a:r>
+              <a:rPr lang="en" sz="1600"/>
+              <a:t>metropolitan areas, </a:t>
+            </a:r>
+            <a:r>
+              <a:rPr lang="en" sz="1600" dirty="0"/>
+              <a:t>and the opportunity to select the flights and the hotels for that area. </a:t>
             </a:r>
             <a:r>
               <a:rPr lang="en-US" sz="1600" dirty="0"/>
@@ -6459,7 +6460,7 @@
             </a:r>
             <a:r>
               <a:rPr lang="en" sz="1600" dirty="0"/>
-              <a:t>page provide data from 2 separate API: Yelp and Covid Act Now. Searched attractions are saved in local storage and rendered on the front page. Structure and styling of the page were developed using </a:t>
+              <a:t>page provide data from 2 separate API: Kayak and Covid Act Now. Searched trips are saved in local storage and rendered on the front page. Structure and styling of the page were developed using </a:t>
             </a:r>
             <a:r>
               <a:rPr lang="en" sz="1600" dirty="0" err="1"/>
@@ -6500,7 +6501,7 @@
             </a:r>
             <a:r>
               <a:rPr lang="en-US" sz="1600" dirty="0"/>
-              <a:t>create a web-page in order to help current and future travelers to minimize their risks and maximize positive outcome of the trip.</a:t>
+              <a:t>create a web-page in order to help current and future travelers to minimize their risks and maximize positive outcome of their trip.</a:t>
             </a:r>
           </a:p>
           <a:p>
@@ -6523,7 +6524,7 @@
             </a:r>
             <a:r>
               <a:rPr lang="en-US" sz="1600" dirty="0"/>
-              <a:t>AS A traveler I WANT to see available attraction options in new city as well as current Covid-19 situation in that city SO THAT </a:t>
+              <a:t>AS A traveler I WANT to see Covid-19 data in selected city as well as select flight and hotel for my destination, SO THAT </a:t>
             </a:r>
             <a:r>
               <a:rPr lang="en-US" sz="1600" dirty="0" err="1"/>
@@ -6531,20 +6532,8 @@
             </a:r>
             <a:r>
               <a:rPr lang="en-US" sz="1600" dirty="0"/>
-              <a:t> can choose whether to travel in that specific place or not and then create the list of things to do </a:t>
+              <a:t> can choose whether to travel in that specific place or not.</a:t>
             </a:r>
-          </a:p>
-          <a:p>
-            <a:pPr marL="457200" lvl="0" indent="-342900" algn="l" rtl="0">
-              <a:spcBef>
-                <a:spcPts val="0"/>
-              </a:spcBef>
-              <a:spcAft>
-                <a:spcPts val="0"/>
-              </a:spcAft>
-              <a:buSzPts val="1800"/>
-              <a:buChar char="●"/>
-            </a:pPr>
             <a:endParaRPr dirty="0"/>
           </a:p>
         </p:txBody>
@@ -6665,7 +6654,7 @@
             </a:r>
           </a:p>
           <a:p>
-            <a:pPr marL="457200" lvl="0" indent="-342900" algn="l" rtl="0">
+            <a:pPr marL="114300" lvl="0" indent="0" algn="l" rtl="0">
               <a:spcBef>
                 <a:spcPts val="0"/>
               </a:spcBef>
@@ -6673,7 +6662,7 @@
                 <a:spcPts val="0"/>
               </a:spcAft>
               <a:buSzPts val="1800"/>
-              <a:buChar char="●"/>
+              <a:buNone/>
             </a:pPr>
             <a:endParaRPr dirty="0"/>
           </a:p>
@@ -6690,36 +6679,7 @@
             </a:pPr>
             <a:r>
               <a:rPr lang="en" dirty="0"/>
-              <a:t>Breakdown of tasks and roles: </a:t>
-            </a:r>
-          </a:p>
-          <a:p>
-            <a:pPr marL="457200" lvl="0" indent="-342900" algn="l" rtl="0">
-              <a:spcBef>
-                <a:spcPts val="0"/>
-              </a:spcBef>
-              <a:spcAft>
-                <a:spcPts val="0"/>
-              </a:spcAft>
-              <a:buSzPts val="1800"/>
-              <a:buChar char="●"/>
-            </a:pPr>
-            <a:endParaRPr dirty="0"/>
-          </a:p>
-          <a:p>
-            <a:pPr marL="457200" lvl="0" indent="-342900" algn="l" rtl="0">
-              <a:spcBef>
-                <a:spcPts val="0"/>
-              </a:spcBef>
-              <a:spcAft>
-                <a:spcPts val="0"/>
-              </a:spcAft>
-              <a:buSzPts val="1800"/>
-              <a:buChar char="●"/>
-            </a:pPr>
-            <a:r>
-              <a:rPr lang="en" dirty="0"/>
-              <a:t>Challenges: Find the right project idea, find the right API data,  connect to data-base (API)</a:t>
+              <a:t>Challenges: Find the right project idea, find the right API data,  connect to API</a:t>
             </a:r>
           </a:p>
           <a:p>
@@ -6936,7 +6896,7 @@
             </a:pPr>
             <a:r>
               <a:rPr lang="en-US" dirty="0"/>
-              <a:t>Possibility to search for international locations, such as regions or cities.</a:t>
+              <a:t>Possibility to search for international locations, such as regions or cities of other countries.</a:t>
             </a:r>
           </a:p>
           <a:p>
@@ -7089,18 +7049,18 @@
           <a:p>
             <a:pPr lvl="0"/>
             <a:r>
-              <a:rPr lang="en" dirty="0"/>
+              <a:rPr lang="en"/>
               <a:t>Deployed:</a:t>
             </a:r>
             <a:r>
-              <a:rPr lang="en-US" dirty="0"/>
-              <a:t>https</a:t>
+              <a:rPr lang="en-US"/>
+              <a:t> </a:t>
             </a:r>
             <a:r>
               <a:rPr lang="en-US" dirty="0">
                 <a:hlinkClick r:id="rId3"/>
               </a:rPr>
-              <a:t>://github.com/slspencer/Katuunko/deployments/activity_log?environment=github-pages</a:t>
+              <a:t>https://slspencer.github.io/Katuunko/</a:t>
             </a:r>
             <a:endParaRPr lang="en-US" dirty="0"/>
           </a:p>

</xml_diff>